<commit_message>
deleted an empty text box
</commit_message>
<xml_diff>
--- a/usecasepresentation.pptx
+++ b/usecasepresentation.pptx
@@ -115,7 +115,7 @@
   </p:defaultTextStyle>
   <p:extLst>
     <p:ext uri="{EFAFB233-063F-42B5-8137-9DF3F51BA10A}">
-      <p15:sldGuideLst xmlns:p15="http://schemas.microsoft.com/office/powerpoint/2012/main"/>
+      <p15:sldGuideLst xmlns:p15="http://schemas.microsoft.com/office/powerpoint/2012/main" xmlns=""/>
     </p:ext>
   </p:extLst>
 </p:presentation>
@@ -312,7 +312,7 @@
           <a:p>
             <a:fld id="{2C1A9416-1E9F-4A9E-8494-D96A666F628A}" type="datetimeFigureOut">
               <a:rPr lang="en-US" smtClean="0"/>
-              <a:t>6/21/2015</a:t>
+              <a:t>6/22/15</a:t>
             </a:fld>
             <a:endParaRPr lang="en-US"/>
           </a:p>
@@ -748,7 +748,7 @@
           <a:p>
             <a:fld id="{2C1A9416-1E9F-4A9E-8494-D96A666F628A}" type="datetimeFigureOut">
               <a:rPr lang="en-US" smtClean="0"/>
-              <a:t>6/21/2015</a:t>
+              <a:t>6/22/15</a:t>
             </a:fld>
             <a:endParaRPr lang="en-US"/>
           </a:p>
@@ -998,7 +998,7 @@
           <a:p>
             <a:fld id="{2C1A9416-1E9F-4A9E-8494-D96A666F628A}" type="datetimeFigureOut">
               <a:rPr lang="en-US" smtClean="0"/>
-              <a:t>6/21/2015</a:t>
+              <a:t>6/22/15</a:t>
             </a:fld>
             <a:endParaRPr lang="en-US"/>
           </a:p>
@@ -1306,7 +1306,7 @@
           <a:p>
             <a:fld id="{2C1A9416-1E9F-4A9E-8494-D96A666F628A}" type="datetimeFigureOut">
               <a:rPr lang="en-US" smtClean="0"/>
-              <a:t>6/21/2015</a:t>
+              <a:t>6/22/15</a:t>
             </a:fld>
             <a:endParaRPr lang="en-US"/>
           </a:p>
@@ -1624,7 +1624,7 @@
           <a:p>
             <a:fld id="{2C1A9416-1E9F-4A9E-8494-D96A666F628A}" type="datetimeFigureOut">
               <a:rPr lang="en-US" smtClean="0"/>
-              <a:t>6/21/2015</a:t>
+              <a:t>6/22/15</a:t>
             </a:fld>
             <a:endParaRPr lang="en-US"/>
           </a:p>
@@ -1926,7 +1926,7 @@
           <a:p>
             <a:fld id="{2C1A9416-1E9F-4A9E-8494-D96A666F628A}" type="datetimeFigureOut">
               <a:rPr lang="en-US" smtClean="0"/>
-              <a:t>6/21/2015</a:t>
+              <a:t>6/22/15</a:t>
             </a:fld>
             <a:endParaRPr lang="en-US"/>
           </a:p>
@@ -2293,7 +2293,7 @@
           <a:p>
             <a:fld id="{2C1A9416-1E9F-4A9E-8494-D96A666F628A}" type="datetimeFigureOut">
               <a:rPr lang="en-US" smtClean="0"/>
-              <a:t>6/21/2015</a:t>
+              <a:t>6/22/15</a:t>
             </a:fld>
             <a:endParaRPr lang="en-US"/>
           </a:p>
@@ -2467,7 +2467,7 @@
           <a:p>
             <a:fld id="{2C1A9416-1E9F-4A9E-8494-D96A666F628A}" type="datetimeFigureOut">
               <a:rPr lang="en-US" smtClean="0"/>
-              <a:t>6/21/2015</a:t>
+              <a:t>6/22/15</a:t>
             </a:fld>
             <a:endParaRPr lang="en-US"/>
           </a:p>
@@ -2647,7 +2647,7 @@
           <a:p>
             <a:fld id="{2C1A9416-1E9F-4A9E-8494-D96A666F628A}" type="datetimeFigureOut">
               <a:rPr lang="en-US" smtClean="0"/>
-              <a:t>6/21/2015</a:t>
+              <a:t>6/22/15</a:t>
             </a:fld>
             <a:endParaRPr lang="en-US"/>
           </a:p>
@@ -2817,7 +2817,7 @@
           <a:p>
             <a:fld id="{2C1A9416-1E9F-4A9E-8494-D96A666F628A}" type="datetimeFigureOut">
               <a:rPr lang="en-US" smtClean="0"/>
-              <a:t>6/21/2015</a:t>
+              <a:t>6/22/15</a:t>
             </a:fld>
             <a:endParaRPr lang="en-US"/>
           </a:p>
@@ -3067,7 +3067,7 @@
           <a:p>
             <a:fld id="{2C1A9416-1E9F-4A9E-8494-D96A666F628A}" type="datetimeFigureOut">
               <a:rPr lang="en-US" smtClean="0"/>
-              <a:t>6/21/2015</a:t>
+              <a:t>6/22/15</a:t>
             </a:fld>
             <a:endParaRPr lang="en-US"/>
           </a:p>
@@ -3303,7 +3303,7 @@
           <a:p>
             <a:fld id="{2C1A9416-1E9F-4A9E-8494-D96A666F628A}" type="datetimeFigureOut">
               <a:rPr lang="en-US" smtClean="0"/>
-              <a:t>6/21/2015</a:t>
+              <a:t>6/22/15</a:t>
             </a:fld>
             <a:endParaRPr lang="en-US"/>
           </a:p>
@@ -3685,7 +3685,7 @@
           <a:p>
             <a:fld id="{2C1A9416-1E9F-4A9E-8494-D96A666F628A}" type="datetimeFigureOut">
               <a:rPr lang="en-US" smtClean="0"/>
-              <a:t>6/21/2015</a:t>
+              <a:t>6/22/15</a:t>
             </a:fld>
             <a:endParaRPr lang="en-US"/>
           </a:p>
@@ -3803,7 +3803,7 @@
           <a:p>
             <a:fld id="{2C1A9416-1E9F-4A9E-8494-D96A666F628A}" type="datetimeFigureOut">
               <a:rPr lang="en-US" smtClean="0"/>
-              <a:t>6/21/2015</a:t>
+              <a:t>6/22/15</a:t>
             </a:fld>
             <a:endParaRPr lang="en-US"/>
           </a:p>
@@ -3898,7 +3898,7 @@
           <a:p>
             <a:fld id="{2C1A9416-1E9F-4A9E-8494-D96A666F628A}" type="datetimeFigureOut">
               <a:rPr lang="en-US" smtClean="0"/>
-              <a:t>6/21/2015</a:t>
+              <a:t>6/22/15</a:t>
             </a:fld>
             <a:endParaRPr lang="en-US"/>
           </a:p>
@@ -4153,7 +4153,7 @@
           <a:p>
             <a:fld id="{2C1A9416-1E9F-4A9E-8494-D96A666F628A}" type="datetimeFigureOut">
               <a:rPr lang="en-US" smtClean="0"/>
-              <a:t>6/21/2015</a:t>
+              <a:t>6/22/15</a:t>
             </a:fld>
             <a:endParaRPr lang="en-US"/>
           </a:p>
@@ -4436,7 +4436,7 @@
           <a:p>
             <a:fld id="{2C1A9416-1E9F-4A9E-8494-D96A666F628A}" type="datetimeFigureOut">
               <a:rPr lang="en-US" smtClean="0"/>
-              <a:t>6/21/2015</a:t>
+              <a:t>6/22/15</a:t>
             </a:fld>
             <a:endParaRPr lang="en-US"/>
           </a:p>
@@ -4842,7 +4842,7 @@
           <a:p>
             <a:fld id="{2C1A9416-1E9F-4A9E-8494-D96A666F628A}" type="datetimeFigureOut">
               <a:rPr lang="en-US" smtClean="0"/>
-              <a:t>6/21/2015</a:t>
+              <a:t>6/22/15</a:t>
             </a:fld>
             <a:endParaRPr lang="en-US"/>
           </a:p>
@@ -6007,7 +6007,6 @@
               <a:rPr lang="en-US" dirty="0" smtClean="0"/>
               <a:t>Kiosks will have power</a:t>
             </a:r>
-            <a:endParaRPr lang="en-US" dirty="0" smtClean="0"/>
           </a:p>
           <a:p>
             <a:pPr marL="342900" indent="-342900">
@@ -6018,7 +6017,6 @@
               <a:rPr lang="en-US" dirty="0" smtClean="0"/>
               <a:t>A method for transporting audiobooks between branches will be available</a:t>
             </a:r>
-            <a:endParaRPr lang="en-US" dirty="0" smtClean="0"/>
           </a:p>
           <a:p>
             <a:pPr marL="342900" indent="-342900">
@@ -6029,7 +6027,6 @@
               <a:rPr lang="en-US" dirty="0" smtClean="0"/>
               <a:t>Kiosk hardware will be in good repair and function as expected</a:t>
             </a:r>
-            <a:endParaRPr lang="en-US" dirty="0" smtClean="0"/>
           </a:p>
           <a:p>
             <a:pPr marL="342900" indent="-342900">
@@ -6040,7 +6037,6 @@
               <a:rPr lang="en-US" dirty="0" smtClean="0"/>
               <a:t>Credit Card data will not be hosted internally</a:t>
             </a:r>
-            <a:endParaRPr lang="en-US" dirty="0" smtClean="0"/>
           </a:p>
           <a:p>
             <a:pPr marL="342900" indent="-342900">
@@ -6219,30 +6215,6 @@
           </a:p>
         </p:txBody>
       </p:sp>
-      <p:sp>
-        <p:nvSpPr>
-          <p:cNvPr id="3" name="Text Placeholder 2"/>
-          <p:cNvSpPr>
-            <a:spLocks noGrp="1"/>
-          </p:cNvSpPr>
-          <p:nvPr>
-            <p:ph type="body" idx="1"/>
-          </p:nvPr>
-        </p:nvSpPr>
-        <p:spPr>
-          <a:xfrm>
-            <a:off x="684212" y="1700011"/>
-            <a:ext cx="8535988" cy="4294389"/>
-          </a:xfrm>
-        </p:spPr>
-        <p:txBody>
-          <a:bodyPr/>
-          <a:lstStyle/>
-          <a:p>
-            <a:endParaRPr lang="en-US" dirty="0"/>
-          </a:p>
-        </p:txBody>
-      </p:sp>
       <p:graphicFrame>
         <p:nvGraphicFramePr>
           <p:cNvPr id="5" name="Table 4"/>
@@ -6252,13 +6224,13 @@
           <p:nvPr>
             <p:extLst>
               <p:ext uri="{D42A27DB-BD31-4B8C-83A1-F6EECF244321}">
-                <p14:modId xmlns:p14="http://schemas.microsoft.com/office/powerpoint/2010/main" val="586962283"/>
+                <p14:modId xmlns:p14="http://schemas.microsoft.com/office/powerpoint/2010/main" val="3539785763"/>
               </p:ext>
             </p:extLst>
           </p:nvPr>
         </p:nvGraphicFramePr>
         <p:xfrm>
-          <a:off x="901521" y="1880312"/>
+          <a:off x="1936661" y="2102510"/>
           <a:ext cx="8318678" cy="4114090"/>
         </p:xfrm>
         <a:graphic>
@@ -6326,12 +6298,12 @@
                     <a:p>
                       <a:pPr algn="l" fontAlgn="b"/>
                       <a:r>
-                        <a:rPr lang="en-US" sz="1100" u="none" strike="noStrike">
+                        <a:rPr lang="en-US" sz="1100" u="none" strike="noStrike" dirty="0">
                           <a:effectLst/>
                         </a:rPr>
                         <a:t>Primary Actor</a:t>
                       </a:r>
-                      <a:endParaRPr lang="en-US" sz="1100" b="1" i="0" u="none" strike="noStrike">
+                      <a:endParaRPr lang="en-US" sz="1100" b="1" i="0" u="none" strike="noStrike" dirty="0">
                         <a:solidFill>
                           <a:srgbClr val="000000"/>
                         </a:solidFill>
@@ -6610,12 +6582,12 @@
                     <a:p>
                       <a:pPr algn="l" fontAlgn="b"/>
                       <a:r>
-                        <a:rPr lang="en-US" sz="1100" u="none" strike="noStrike">
+                        <a:rPr lang="en-US" sz="1100" u="none" strike="noStrike" dirty="0">
                           <a:effectLst/>
                         </a:rPr>
                         <a:t>Customer</a:t>
                       </a:r>
-                      <a:endParaRPr lang="en-US" sz="1100" b="0" i="0" u="none" strike="noStrike">
+                      <a:endParaRPr lang="en-US" sz="1100" b="0" i="0" u="none" strike="noStrike" dirty="0">
                         <a:solidFill>
                           <a:srgbClr val="000000"/>
                         </a:solidFill>
@@ -7145,15 +7117,7 @@
           <a:p>
             <a:r>
               <a:rPr lang="en-US" dirty="0" smtClean="0"/>
-              <a:t>Library </a:t>
-            </a:r>
-            <a:r>
-              <a:rPr lang="en-US" dirty="0" smtClean="0"/>
-              <a:t>staff </a:t>
-            </a:r>
-            <a:r>
-              <a:rPr lang="en-US" dirty="0" smtClean="0"/>
-              <a:t>– Local branch staff responsible for stocking audiobooks and registering new users</a:t>
+              <a:t>Library staff – Local branch staff responsible for stocking audiobooks and registering new users</a:t>
             </a:r>
           </a:p>
           <a:p>
@@ -7221,7 +7185,7 @@
     </a:clrScheme>
     <a:fontScheme name="Slice">
       <a:majorFont>
-        <a:latin typeface="Century Gothic" panose="020B0502020202020204"/>
+        <a:latin typeface="Century Gothic"/>
         <a:ea typeface=""/>
         <a:cs typeface=""/>
         <a:font script="Jpan" typeface="メイリオ"/>
@@ -7256,7 +7220,7 @@
         <a:font script="Geor" typeface="Sylfaen"/>
       </a:majorFont>
       <a:minorFont>
-        <a:latin typeface="Century Gothic" panose="020B0502020202020204"/>
+        <a:latin typeface="Century Gothic"/>
         <a:ea typeface=""/>
         <a:cs typeface=""/>
         <a:font script="Jpan" typeface="メイリオ"/>
@@ -7446,7 +7410,7 @@
   <a:extraClrSchemeLst/>
   <a:extLst>
     <a:ext uri="{05A4C25C-085E-4340-85A3-A5531E510DB2}">
-      <thm15:themeFamily xmlns:thm15="http://schemas.microsoft.com/office/thememl/2012/main" name="Slice" id="{0507925B-6AC9-4358-8E18-C330545D08F8}" vid="{13FEC7C6-62A9-40C4-99D2-581AACACAA2F}"/>
+      <thm15:themeFamily xmlns:thm15="http://schemas.microsoft.com/office/thememl/2012/main" xmlns="" name="Slice" id="{0507925B-6AC9-4358-8E18-C330545D08F8}" vid="{13FEC7C6-62A9-40C4-99D2-581AACACAA2F}"/>
     </a:ext>
   </a:extLst>
 </a:theme>

</xml_diff>